<commit_message>
Kode til Forelesning 4
</commit_message>
<xml_diff>
--- a/Forelesning 3.pptx
+++ b/Forelesning 3.pptx
@@ -146,7 +146,7 @@
   <pc:docChgLst>
     <pc:chgData name="Ammar Haddad" userId="93eb3f186d2f468f" providerId="LiveId" clId="{F54644CF-CEBD-41B2-B9BB-E87F712EA120}"/>
     <pc:docChg chg="undo redo custSel addSld delSld modSld sldOrd">
-      <pc:chgData name="Ammar Haddad" userId="93eb3f186d2f468f" providerId="LiveId" clId="{F54644CF-CEBD-41B2-B9BB-E87F712EA120}" dt="2021-10-31T23:28:48.031" v="7541" actId="47"/>
+      <pc:chgData name="Ammar Haddad" userId="93eb3f186d2f468f" providerId="LiveId" clId="{F54644CF-CEBD-41B2-B9BB-E87F712EA120}" dt="2021-11-03T09:44:10.338" v="7613" actId="20577"/>
       <pc:docMkLst>
         <pc:docMk/>
       </pc:docMkLst>
@@ -667,7 +667,7 @@
         </pc:spChg>
       </pc:sldChg>
       <pc:sldChg chg="modSp add mod ord modNotesTx">
-        <pc:chgData name="Ammar Haddad" userId="93eb3f186d2f468f" providerId="LiveId" clId="{F54644CF-CEBD-41B2-B9BB-E87F712EA120}" dt="2021-10-31T21:31:43.043" v="4673" actId="20577"/>
+        <pc:chgData name="Ammar Haddad" userId="93eb3f186d2f468f" providerId="LiveId" clId="{F54644CF-CEBD-41B2-B9BB-E87F712EA120}" dt="2021-11-01T19:29:45.091" v="7612" actId="20577"/>
         <pc:sldMkLst>
           <pc:docMk/>
           <pc:sldMk cId="2462057063" sldId="308"/>
@@ -681,7 +681,7 @@
           </ac:spMkLst>
         </pc:spChg>
         <pc:spChg chg="mod">
-          <ac:chgData name="Ammar Haddad" userId="93eb3f186d2f468f" providerId="LiveId" clId="{F54644CF-CEBD-41B2-B9BB-E87F712EA120}" dt="2021-10-31T21:31:43.043" v="4673" actId="20577"/>
+          <ac:chgData name="Ammar Haddad" userId="93eb3f186d2f468f" providerId="LiveId" clId="{F54644CF-CEBD-41B2-B9BB-E87F712EA120}" dt="2021-11-01T19:29:45.091" v="7612" actId="20577"/>
           <ac:spMkLst>
             <pc:docMk/>
             <pc:sldMk cId="2462057063" sldId="308"/>
@@ -854,7 +854,7 @@
         </pc:picChg>
       </pc:sldChg>
       <pc:sldChg chg="modSp add mod ord modNotesTx">
-        <pc:chgData name="Ammar Haddad" userId="93eb3f186d2f468f" providerId="LiveId" clId="{F54644CF-CEBD-41B2-B9BB-E87F712EA120}" dt="2021-10-31T21:21:18.697" v="4161" actId="20577"/>
+        <pc:chgData name="Ammar Haddad" userId="93eb3f186d2f468f" providerId="LiveId" clId="{F54644CF-CEBD-41B2-B9BB-E87F712EA120}" dt="2021-11-03T09:44:10.338" v="7613" actId="20577"/>
         <pc:sldMkLst>
           <pc:docMk/>
           <pc:sldMk cId="1645755116" sldId="311"/>
@@ -868,7 +868,7 @@
           </ac:spMkLst>
         </pc:spChg>
         <pc:spChg chg="mod">
-          <ac:chgData name="Ammar Haddad" userId="93eb3f186d2f468f" providerId="LiveId" clId="{F54644CF-CEBD-41B2-B9BB-E87F712EA120}" dt="2021-10-31T21:21:18.697" v="4161" actId="20577"/>
+          <ac:chgData name="Ammar Haddad" userId="93eb3f186d2f468f" providerId="LiveId" clId="{F54644CF-CEBD-41B2-B9BB-E87F712EA120}" dt="2021-11-03T09:44:10.338" v="7613" actId="20577"/>
           <ac:spMkLst>
             <pc:docMk/>
             <pc:sldMk cId="1645755116" sldId="311"/>
@@ -2808,7 +2808,7 @@
           <a:p>
             <a:fld id="{9CFB21C5-2699-414D-BD7D-79BFDE2E407F}" type="datetimeFigureOut">
               <a:rPr lang="nb-NO" smtClean="0"/>
-              <a:t>01.11.2021</a:t>
+              <a:t>03.11.2021</a:t>
             </a:fld>
             <a:endParaRPr lang="nb-NO"/>
           </a:p>
@@ -2986,7 +2986,7 @@
           <a:p>
             <a:fld id="{6B3FED17-5FBD-1E4B-BF0D-610BD3BE4D53}" type="datetimeFigureOut">
               <a:rPr lang="nb-NO" smtClean="0"/>
-              <a:t>01.11.2021</a:t>
+              <a:t>03.11.2021</a:t>
             </a:fld>
             <a:endParaRPr lang="nb-NO"/>
           </a:p>
@@ -18350,15 +18350,7 @@
             </a:r>
             <a:r>
               <a:rPr lang="nb-NO" sz="3000" dirty="0"/>
-              <a:t> (ansvar for å </a:t>
-            </a:r>
-            <a:r>
-              <a:rPr lang="nb-NO" sz="3000" dirty="0" err="1"/>
-              <a:t>innholde</a:t>
-            </a:r>
-            <a:r>
-              <a:rPr lang="nb-NO" sz="3000" dirty="0"/>
-              <a:t> data fra db)</a:t>
+              <a:t> (ansvar for å inneholde data fra db)</a:t>
             </a:r>
           </a:p>
           <a:p>
@@ -18908,6 +18900,32 @@
               <a:rPr lang="nb-NO" sz="3000" dirty="0"/>
               <a:t>Fra den kan du navigere til de ulike sidene.</a:t>
             </a:r>
+          </a:p>
+          <a:p>
+            <a:pPr marL="342900" indent="-342900" algn="l">
+              <a:lnSpc>
+                <a:spcPct val="150000"/>
+              </a:lnSpc>
+              <a:buFont typeface="Arial" panose="020B0604020202020204" pitchFamily="34" charset="0"/>
+              <a:buChar char="•"/>
+            </a:pPr>
+            <a:r>
+              <a:rPr lang="nb-NO" sz="3000" dirty="0"/>
+              <a:t>JSP er </a:t>
+            </a:r>
+            <a:r>
+              <a:rPr lang="nb-NO" sz="3000" dirty="0" err="1"/>
+              <a:t>basically</a:t>
+            </a:r>
+            <a:r>
+              <a:rPr lang="nb-NO" sz="3000" dirty="0"/>
+              <a:t> en html-fil hvor man kan skrive JAVA </a:t>
+            </a:r>
+            <a:r>
+              <a:rPr lang="nb-NO" sz="3000"/>
+              <a:t>i tillegg.</a:t>
+            </a:r>
+            <a:endParaRPr lang="nb-NO" sz="3000" dirty="0"/>
           </a:p>
         </p:txBody>
       </p:sp>

</xml_diff>

<commit_message>
Kode til Forelesning 3
</commit_message>
<xml_diff>
--- a/Forelesning 3.pptx
+++ b/Forelesning 3.pptx
@@ -136,7 +136,7 @@
 <file path=ppt/revisionInfo.xml><?xml version="1.0" encoding="utf-8"?>
 <p1510:revInfo xmlns:a="http://schemas.openxmlformats.org/drawingml/2006/main" xmlns:r="http://schemas.openxmlformats.org/officeDocument/2006/relationships" xmlns:p1510="http://schemas.microsoft.com/office/powerpoint/2015/10/main">
   <p1510:revLst>
-    <p1510:client id="{F54644CF-CEBD-41B2-B9BB-E87F712EA120}" v="55" dt="2021-10-31T22:58:52.624"/>
+    <p1510:client id="{F54644CF-CEBD-41B2-B9BB-E87F712EA120}" v="56" dt="2021-11-04T17:24:38.897"/>
   </p1510:revLst>
 </p1510:revInfo>
 </file>
@@ -146,7 +146,7 @@
   <pc:docChgLst>
     <pc:chgData name="Ammar Haddad" userId="93eb3f186d2f468f" providerId="LiveId" clId="{F54644CF-CEBD-41B2-B9BB-E87F712EA120}"/>
     <pc:docChg chg="undo redo custSel addSld delSld modSld sldOrd">
-      <pc:chgData name="Ammar Haddad" userId="93eb3f186d2f468f" providerId="LiveId" clId="{F54644CF-CEBD-41B2-B9BB-E87F712EA120}" dt="2021-11-03T09:44:10.338" v="7613" actId="20577"/>
+      <pc:chgData name="Ammar Haddad" userId="93eb3f186d2f468f" providerId="LiveId" clId="{F54644CF-CEBD-41B2-B9BB-E87F712EA120}" dt="2021-11-04T17:24:40.739" v="7641" actId="27636"/>
       <pc:docMkLst>
         <pc:docMk/>
       </pc:docMkLst>
@@ -1192,12 +1192,20 @@
           </ac:spMkLst>
         </pc:spChg>
       </pc:sldChg>
-      <pc:sldChg chg="add ord">
-        <pc:chgData name="Ammar Haddad" userId="93eb3f186d2f468f" providerId="LiveId" clId="{F54644CF-CEBD-41B2-B9BB-E87F712EA120}" dt="2021-10-31T22:58:55.512" v="6785"/>
+      <pc:sldChg chg="modSp add mod ord">
+        <pc:chgData name="Ammar Haddad" userId="93eb3f186d2f468f" providerId="LiveId" clId="{F54644CF-CEBD-41B2-B9BB-E87F712EA120}" dt="2021-11-04T17:24:40.739" v="7641" actId="27636"/>
         <pc:sldMkLst>
           <pc:docMk/>
           <pc:sldMk cId="1260990829" sldId="322"/>
         </pc:sldMkLst>
+        <pc:spChg chg="mod">
+          <ac:chgData name="Ammar Haddad" userId="93eb3f186d2f468f" providerId="LiveId" clId="{F54644CF-CEBD-41B2-B9BB-E87F712EA120}" dt="2021-11-04T17:24:40.739" v="7641" actId="27636"/>
+          <ac:spMkLst>
+            <pc:docMk/>
+            <pc:sldMk cId="1260990829" sldId="322"/>
+            <ac:spMk id="3" creationId="{A662D049-34B3-430B-BF9D-516F3F7735BA}"/>
+          </ac:spMkLst>
+        </pc:spChg>
       </pc:sldChg>
     </pc:docChg>
   </pc:docChgLst>
@@ -2808,7 +2816,7 @@
           <a:p>
             <a:fld id="{9CFB21C5-2699-414D-BD7D-79BFDE2E407F}" type="datetimeFigureOut">
               <a:rPr lang="nb-NO" smtClean="0"/>
-              <a:t>03.11.2021</a:t>
+              <a:t>04.11.2021</a:t>
             </a:fld>
             <a:endParaRPr lang="nb-NO"/>
           </a:p>
@@ -2986,7 +2994,7 @@
           <a:p>
             <a:fld id="{6B3FED17-5FBD-1E4B-BF0D-610BD3BE4D53}" type="datetimeFigureOut">
               <a:rPr lang="nb-NO" smtClean="0"/>
-              <a:t>03.11.2021</a:t>
+              <a:t>04.11.2021</a:t>
             </a:fld>
             <a:endParaRPr lang="nb-NO"/>
           </a:p>
@@ -15980,7 +15988,7 @@
         </p:spPr>
         <p:txBody>
           <a:bodyPr>
-            <a:normAutofit fontScale="55000" lnSpcReduction="20000"/>
+            <a:normAutofit fontScale="47500" lnSpcReduction="20000"/>
           </a:bodyPr>
           <a:lstStyle/>
           <a:p>
@@ -16163,9 +16171,36 @@
               <a:t>admin</a:t>
             </a:r>
             <a:r>
+              <a:rPr lang="nb-NO" sz="3000"/>
+              <a:t>.</a:t>
+            </a:r>
+            <a:endParaRPr lang="nb-NO" sz="3000" dirty="0"/>
+          </a:p>
+          <a:p>
+            <a:pPr algn="l">
+              <a:lnSpc>
+                <a:spcPct val="150000"/>
+              </a:lnSpc>
+            </a:pPr>
+            <a:r>
               <a:rPr lang="nb-NO" sz="3000" dirty="0"/>
-              <a:t>.</a:t>
-            </a:r>
+              <a:t>Kode ligger i: </a:t>
+            </a:r>
+            <a:r>
+              <a:rPr lang="nb-NO" sz="3000" dirty="0">
+                <a:hlinkClick r:id="rId3"/>
+              </a:rPr>
+              <a:t>https://github.com/Had96dad/EkstraForelesninger</a:t>
+            </a:r>
+            <a:endParaRPr lang="nb-NO" sz="3000" dirty="0"/>
+          </a:p>
+          <a:p>
+            <a:pPr algn="l">
+              <a:lnSpc>
+                <a:spcPct val="150000"/>
+              </a:lnSpc>
+            </a:pPr>
+            <a:endParaRPr lang="nb-NO" sz="3000" dirty="0"/>
           </a:p>
         </p:txBody>
       </p:sp>

</xml_diff>